<commit_message>
Updated Final Deliverable for Iteration 2
</commit_message>
<xml_diff>
--- a/docs/Iteration_1_Presentation_Deliverable/BNU- BCC-1.pptx
+++ b/docs/Iteration_1_Presentation_Deliverable/BNU- BCC-1.pptx
@@ -231,7 +231,7 @@
           <a:p>
             <a:fld id="{9F5B7F43-D709-4156-92DE-FDD93A3D4DD8}" type="datetimeFigureOut">
               <a:rPr lang="en-US" smtClean="0"/>
-              <a:t>9/25/2019</a:t>
+              <a:t>11/1/2019</a:t>
             </a:fld>
             <a:endParaRPr lang="en-US"/>
           </a:p>
@@ -1709,7 +1709,7 @@
           <a:p>
             <a:fld id="{D6B2C176-364D-45CF-B051-87E4CCEA3977}" type="datetime1">
               <a:rPr lang="en-US" smtClean="0"/>
-              <a:t>9/25/2019</a:t>
+              <a:t>11/1/2019</a:t>
             </a:fld>
             <a:endParaRPr lang="en-US"/>
           </a:p>
@@ -1950,7 +1950,7 @@
           <a:p>
             <a:fld id="{09818545-2C2E-4D7F-9402-E36B82A7F1A8}" type="datetime1">
               <a:rPr lang="en-US" smtClean="0"/>
-              <a:t>9/25/2019</a:t>
+              <a:t>11/1/2019</a:t>
             </a:fld>
             <a:endParaRPr lang="en-US"/>
           </a:p>
@@ -2133,7 +2133,7 @@
           <a:p>
             <a:fld id="{EBC15077-952D-4215-B24B-22F295445043}" type="datetime1">
               <a:rPr lang="en-US" smtClean="0"/>
-              <a:t>9/25/2019</a:t>
+              <a:t>11/1/2019</a:t>
             </a:fld>
             <a:endParaRPr lang="en-US"/>
           </a:p>
@@ -2306,7 +2306,7 @@
           <a:p>
             <a:fld id="{A5E9A226-4227-462D-AA31-D5502D6BC73F}" type="datetime1">
               <a:rPr lang="en-US" smtClean="0"/>
-              <a:t>9/25/2019</a:t>
+              <a:t>11/1/2019</a:t>
             </a:fld>
             <a:endParaRPr lang="en-US"/>
           </a:p>
@@ -2585,7 +2585,7 @@
           <a:p>
             <a:fld id="{A8125E2B-75A6-490D-BAAC-25A411516A6B}" type="datetime1">
               <a:rPr lang="en-US" smtClean="0"/>
-              <a:t>9/25/2019</a:t>
+              <a:t>11/1/2019</a:t>
             </a:fld>
             <a:endParaRPr lang="en-US"/>
           </a:p>
@@ -3789,7 +3789,7 @@
           <a:p>
             <a:fld id="{60ACFCB6-2A51-4C8B-AB67-6366FE46D3DF}" type="datetime1">
               <a:rPr lang="en-US" smtClean="0"/>
-              <a:t>9/25/2019</a:t>
+              <a:t>11/1/2019</a:t>
             </a:fld>
             <a:endParaRPr lang="en-US"/>
           </a:p>
@@ -4182,7 +4182,7 @@
           <a:p>
             <a:fld id="{A425D10D-6444-481C-BEB5-1FCE3F210512}" type="datetime1">
               <a:rPr lang="en-US" smtClean="0"/>
-              <a:t>9/25/2019</a:t>
+              <a:t>11/1/2019</a:t>
             </a:fld>
             <a:endParaRPr lang="en-US"/>
           </a:p>
@@ -4308,7 +4308,7 @@
           <a:p>
             <a:fld id="{18E5ECC7-51BC-4A84-8B9E-A01F31DB71EB}" type="datetime1">
               <a:rPr lang="en-US" smtClean="0"/>
-              <a:t>9/25/2019</a:t>
+              <a:t>11/1/2019</a:t>
             </a:fld>
             <a:endParaRPr lang="en-US"/>
           </a:p>
@@ -4406,7 +4406,7 @@
           <a:p>
             <a:fld id="{DFAF760B-E7F1-400C-802C-EC7A7DD5D9A6}" type="datetime1">
               <a:rPr lang="en-US" smtClean="0"/>
-              <a:t>9/25/2019</a:t>
+              <a:t>11/1/2019</a:t>
             </a:fld>
             <a:endParaRPr lang="en-US"/>
           </a:p>
@@ -5172,7 +5172,7 @@
           <a:p>
             <a:fld id="{FA03CDC5-0A20-4D07-98A8-5A8198655193}" type="datetime1">
               <a:rPr lang="en-US" smtClean="0"/>
-              <a:t>9/25/2019</a:t>
+              <a:t>11/1/2019</a:t>
             </a:fld>
             <a:endParaRPr lang="en-US"/>
           </a:p>
@@ -6015,7 +6015,7 @@
           <a:p>
             <a:fld id="{BB14EE42-ADC5-494F-A5A4-79C962F81066}" type="datetime1">
               <a:rPr lang="en-US" smtClean="0"/>
-              <a:t>9/25/2019</a:t>
+              <a:t>11/1/2019</a:t>
             </a:fld>
             <a:endParaRPr lang="en-US"/>
           </a:p>
@@ -6245,7 +6245,7 @@
           <a:p>
             <a:fld id="{AD736A4C-E143-40CE-9F0F-B2B82425E010}" type="datetime1">
               <a:rPr lang="en-US" smtClean="0"/>
-              <a:t>9/25/2019</a:t>
+              <a:t>11/1/2019</a:t>
             </a:fld>
             <a:endParaRPr lang="en-US"/>
           </a:p>
@@ -8967,12 +8967,69 @@
           </a:p>
         </p:txBody>
       </p:sp>
+      <p:sp>
+        <p:nvSpPr>
+          <p:cNvPr id="3" name="Footer Placeholder 2">
+            <a:extLst>
+              <a:ext uri="{FF2B5EF4-FFF2-40B4-BE49-F238E27FC236}">
+                <a16:creationId xmlns:a16="http://schemas.microsoft.com/office/drawing/2014/main" id="{0B728EAC-15E0-4C61-BF94-2D52255844EA}"/>
+              </a:ext>
+            </a:extLst>
+          </p:cNvPr>
+          <p:cNvSpPr>
+            <a:spLocks noGrp="1"/>
+          </p:cNvSpPr>
+          <p:nvPr>
+            <p:ph type="ftr" sz="quarter" idx="11"/>
+          </p:nvPr>
+        </p:nvSpPr>
+        <p:spPr/>
+        <p:txBody>
+          <a:bodyPr/>
+          <a:lstStyle/>
+          <a:p>
+            <a:r>
+              <a:rPr lang="en-US"/>
+              <a:t>Mark Fuller, Kevin Kulda, Connor Woodahl --- https://github.com/markfuller/BNU</a:t>
+            </a:r>
+          </a:p>
+        </p:txBody>
+      </p:sp>
+      <p:sp>
+        <p:nvSpPr>
+          <p:cNvPr id="4" name="Slide Number Placeholder 3">
+            <a:extLst>
+              <a:ext uri="{FF2B5EF4-FFF2-40B4-BE49-F238E27FC236}">
+                <a16:creationId xmlns:a16="http://schemas.microsoft.com/office/drawing/2014/main" id="{C8911D62-3B8F-42AF-901F-8880C31FC2A6}"/>
+              </a:ext>
+            </a:extLst>
+          </p:cNvPr>
+          <p:cNvSpPr>
+            <a:spLocks noGrp="1"/>
+          </p:cNvSpPr>
+          <p:nvPr>
+            <p:ph type="sldNum" sz="quarter" idx="12"/>
+          </p:nvPr>
+        </p:nvSpPr>
+        <p:spPr/>
+        <p:txBody>
+          <a:bodyPr/>
+          <a:lstStyle/>
+          <a:p>
+            <a:fld id="{40FC477F-3197-4E88-B387-83A53B82C48D}" type="slidenum">
+              <a:rPr lang="en-US" smtClean="0"/>
+              <a:t>13</a:t>
+            </a:fld>
+            <a:endParaRPr lang="en-US"/>
+          </a:p>
+        </p:txBody>
+      </p:sp>
       <p:pic>
         <p:nvPicPr>
-          <p:cNvPr id="6" name="Picture 5" descr="A close up of a map&#10;&#10;Description automatically generated">
+          <p:cNvPr id="7" name="Picture 6">
             <a:extLst>
               <a:ext uri="{FF2B5EF4-FFF2-40B4-BE49-F238E27FC236}">
-                <a16:creationId xmlns:a16="http://schemas.microsoft.com/office/drawing/2014/main" id="{F2E46C92-ECB5-445C-A3A3-0877C497480A}"/>
+                <a16:creationId xmlns:a16="http://schemas.microsoft.com/office/drawing/2014/main" id="{DFF2BC5D-1DF9-4BC1-BA84-F44C8F3C6AAA}"/>
               </a:ext>
             </a:extLst>
           </p:cNvPr>
@@ -8982,84 +9039,21 @@
           <p:nvPr/>
         </p:nvPicPr>
         <p:blipFill>
-          <a:blip r:embed="rId2">
-            <a:extLst>
-              <a:ext uri="{28A0092B-C50C-407E-A947-70E740481C1C}">
-                <a14:useLocalDpi xmlns:a14="http://schemas.microsoft.com/office/drawing/2010/main" val="0"/>
-              </a:ext>
-            </a:extLst>
-          </a:blip>
+          <a:blip r:embed="rId2"/>
           <a:stretch>
             <a:fillRect/>
           </a:stretch>
         </p:blipFill>
         <p:spPr>
           <a:xfrm>
-            <a:off x="2444644" y="1595117"/>
-            <a:ext cx="7302711" cy="4985287"/>
+            <a:off x="7501813" y="165833"/>
+            <a:ext cx="4354555" cy="5717565"/>
           </a:xfrm>
           <a:prstGeom prst="rect">
             <a:avLst/>
           </a:prstGeom>
         </p:spPr>
       </p:pic>
-      <p:sp>
-        <p:nvSpPr>
-          <p:cNvPr id="3" name="Footer Placeholder 2">
-            <a:extLst>
-              <a:ext uri="{FF2B5EF4-FFF2-40B4-BE49-F238E27FC236}">
-                <a16:creationId xmlns:a16="http://schemas.microsoft.com/office/drawing/2014/main" id="{0B728EAC-15E0-4C61-BF94-2D52255844EA}"/>
-              </a:ext>
-            </a:extLst>
-          </p:cNvPr>
-          <p:cNvSpPr>
-            <a:spLocks noGrp="1"/>
-          </p:cNvSpPr>
-          <p:nvPr>
-            <p:ph type="ftr" sz="quarter" idx="11"/>
-          </p:nvPr>
-        </p:nvSpPr>
-        <p:spPr/>
-        <p:txBody>
-          <a:bodyPr/>
-          <a:lstStyle/>
-          <a:p>
-            <a:r>
-              <a:rPr lang="en-US"/>
-              <a:t>Mark Fuller, Kevin Kulda, Connor Woodahl --- https://github.com/markfuller/BNU</a:t>
-            </a:r>
-          </a:p>
-        </p:txBody>
-      </p:sp>
-      <p:sp>
-        <p:nvSpPr>
-          <p:cNvPr id="4" name="Slide Number Placeholder 3">
-            <a:extLst>
-              <a:ext uri="{FF2B5EF4-FFF2-40B4-BE49-F238E27FC236}">
-                <a16:creationId xmlns:a16="http://schemas.microsoft.com/office/drawing/2014/main" id="{C8911D62-3B8F-42AF-901F-8880C31FC2A6}"/>
-              </a:ext>
-            </a:extLst>
-          </p:cNvPr>
-          <p:cNvSpPr>
-            <a:spLocks noGrp="1"/>
-          </p:cNvSpPr>
-          <p:nvPr>
-            <p:ph type="sldNum" sz="quarter" idx="12"/>
-          </p:nvPr>
-        </p:nvSpPr>
-        <p:spPr/>
-        <p:txBody>
-          <a:bodyPr/>
-          <a:lstStyle/>
-          <a:p>
-            <a:fld id="{40FC477F-3197-4E88-B387-83A53B82C48D}" type="slidenum">
-              <a:rPr lang="en-US" smtClean="0"/>
-              <a:t>13</a:t>
-            </a:fld>
-            <a:endParaRPr lang="en-US"/>
-          </a:p>
-        </p:txBody>
-      </p:sp>
     </p:spTree>
     <p:extLst>
       <p:ext uri="{BB962C8B-B14F-4D97-AF65-F5344CB8AC3E}">
@@ -12566,12 +12560,69 @@
           </a:p>
         </p:txBody>
       </p:sp>
+      <p:sp>
+        <p:nvSpPr>
+          <p:cNvPr id="3" name="Footer Placeholder 2">
+            <a:extLst>
+              <a:ext uri="{FF2B5EF4-FFF2-40B4-BE49-F238E27FC236}">
+                <a16:creationId xmlns:a16="http://schemas.microsoft.com/office/drawing/2014/main" id="{6821C388-567B-4565-972F-D025D25184CF}"/>
+              </a:ext>
+            </a:extLst>
+          </p:cNvPr>
+          <p:cNvSpPr>
+            <a:spLocks noGrp="1"/>
+          </p:cNvSpPr>
+          <p:nvPr>
+            <p:ph type="ftr" sz="quarter" idx="11"/>
+          </p:nvPr>
+        </p:nvSpPr>
+        <p:spPr/>
+        <p:txBody>
+          <a:bodyPr/>
+          <a:lstStyle/>
+          <a:p>
+            <a:r>
+              <a:rPr lang="en-US"/>
+              <a:t>Mark Fuller, Kevin Kulda, Connor Woodahl --- https://github.com/markfuller/BNU</a:t>
+            </a:r>
+          </a:p>
+        </p:txBody>
+      </p:sp>
+      <p:sp>
+        <p:nvSpPr>
+          <p:cNvPr id="4" name="Slide Number Placeholder 3">
+            <a:extLst>
+              <a:ext uri="{FF2B5EF4-FFF2-40B4-BE49-F238E27FC236}">
+                <a16:creationId xmlns:a16="http://schemas.microsoft.com/office/drawing/2014/main" id="{E1C259B0-6483-4F43-802B-13C761519795}"/>
+              </a:ext>
+            </a:extLst>
+          </p:cNvPr>
+          <p:cNvSpPr>
+            <a:spLocks noGrp="1"/>
+          </p:cNvSpPr>
+          <p:nvPr>
+            <p:ph type="sldNum" sz="quarter" idx="12"/>
+          </p:nvPr>
+        </p:nvSpPr>
+        <p:spPr/>
+        <p:txBody>
+          <a:bodyPr/>
+          <a:lstStyle/>
+          <a:p>
+            <a:fld id="{40FC477F-3197-4E88-B387-83A53B82C48D}" type="slidenum">
+              <a:rPr lang="en-US" smtClean="0"/>
+              <a:t>22</a:t>
+            </a:fld>
+            <a:endParaRPr lang="en-US"/>
+          </a:p>
+        </p:txBody>
+      </p:sp>
       <p:pic>
         <p:nvPicPr>
-          <p:cNvPr id="25" name="Picture 24" descr="A screenshot of a social media post&#10;&#10;Description automatically generated">
+          <p:cNvPr id="6" name="Picture 5">
             <a:extLst>
               <a:ext uri="{FF2B5EF4-FFF2-40B4-BE49-F238E27FC236}">
-                <a16:creationId xmlns:a16="http://schemas.microsoft.com/office/drawing/2014/main" id="{A336ECE5-FB4C-49C5-8B89-1EBA2A47D4F0}"/>
+                <a16:creationId xmlns:a16="http://schemas.microsoft.com/office/drawing/2014/main" id="{1CFF5938-4AFF-4693-A77E-1561915C11B6}"/>
               </a:ext>
             </a:extLst>
           </p:cNvPr>
@@ -12594,71 +12645,14 @@
         </p:blipFill>
         <p:spPr>
           <a:xfrm>
-            <a:off x="1702855" y="1406394"/>
-            <a:ext cx="8786289" cy="5451606"/>
+            <a:off x="3634154" y="705794"/>
+            <a:ext cx="7795846" cy="5029814"/>
           </a:xfrm>
           <a:prstGeom prst="rect">
             <a:avLst/>
           </a:prstGeom>
         </p:spPr>
       </p:pic>
-      <p:sp>
-        <p:nvSpPr>
-          <p:cNvPr id="3" name="Footer Placeholder 2">
-            <a:extLst>
-              <a:ext uri="{FF2B5EF4-FFF2-40B4-BE49-F238E27FC236}">
-                <a16:creationId xmlns:a16="http://schemas.microsoft.com/office/drawing/2014/main" id="{6821C388-567B-4565-972F-D025D25184CF}"/>
-              </a:ext>
-            </a:extLst>
-          </p:cNvPr>
-          <p:cNvSpPr>
-            <a:spLocks noGrp="1"/>
-          </p:cNvSpPr>
-          <p:nvPr>
-            <p:ph type="ftr" sz="quarter" idx="11"/>
-          </p:nvPr>
-        </p:nvSpPr>
-        <p:spPr/>
-        <p:txBody>
-          <a:bodyPr/>
-          <a:lstStyle/>
-          <a:p>
-            <a:r>
-              <a:rPr lang="en-US"/>
-              <a:t>Mark Fuller, Kevin Kulda, Connor Woodahl --- https://github.com/markfuller/BNU</a:t>
-            </a:r>
-          </a:p>
-        </p:txBody>
-      </p:sp>
-      <p:sp>
-        <p:nvSpPr>
-          <p:cNvPr id="4" name="Slide Number Placeholder 3">
-            <a:extLst>
-              <a:ext uri="{FF2B5EF4-FFF2-40B4-BE49-F238E27FC236}">
-                <a16:creationId xmlns:a16="http://schemas.microsoft.com/office/drawing/2014/main" id="{E1C259B0-6483-4F43-802B-13C761519795}"/>
-              </a:ext>
-            </a:extLst>
-          </p:cNvPr>
-          <p:cNvSpPr>
-            <a:spLocks noGrp="1"/>
-          </p:cNvSpPr>
-          <p:nvPr>
-            <p:ph type="sldNum" sz="quarter" idx="12"/>
-          </p:nvPr>
-        </p:nvSpPr>
-        <p:spPr/>
-        <p:txBody>
-          <a:bodyPr/>
-          <a:lstStyle/>
-          <a:p>
-            <a:fld id="{40FC477F-3197-4E88-B387-83A53B82C48D}" type="slidenum">
-              <a:rPr lang="en-US" smtClean="0"/>
-              <a:t>22</a:t>
-            </a:fld>
-            <a:endParaRPr lang="en-US"/>
-          </a:p>
-        </p:txBody>
-      </p:sp>
     </p:spTree>
     <p:extLst>
       <p:ext uri="{BB962C8B-B14F-4D97-AF65-F5344CB8AC3E}">
@@ -12717,12 +12711,69 @@
           </a:p>
         </p:txBody>
       </p:sp>
+      <p:sp>
+        <p:nvSpPr>
+          <p:cNvPr id="3" name="Footer Placeholder 2">
+            <a:extLst>
+              <a:ext uri="{FF2B5EF4-FFF2-40B4-BE49-F238E27FC236}">
+                <a16:creationId xmlns:a16="http://schemas.microsoft.com/office/drawing/2014/main" id="{87B50719-C0C2-4DCB-B6D3-48BD38959E84}"/>
+              </a:ext>
+            </a:extLst>
+          </p:cNvPr>
+          <p:cNvSpPr>
+            <a:spLocks noGrp="1"/>
+          </p:cNvSpPr>
+          <p:nvPr>
+            <p:ph type="ftr" sz="quarter" idx="11"/>
+          </p:nvPr>
+        </p:nvSpPr>
+        <p:spPr/>
+        <p:txBody>
+          <a:bodyPr/>
+          <a:lstStyle/>
+          <a:p>
+            <a:r>
+              <a:rPr lang="en-US"/>
+              <a:t>Mark Fuller, Kevin Kulda, Connor Woodahl --- https://github.com/markfuller/BNU</a:t>
+            </a:r>
+          </a:p>
+        </p:txBody>
+      </p:sp>
+      <p:sp>
+        <p:nvSpPr>
+          <p:cNvPr id="5" name="Slide Number Placeholder 4">
+            <a:extLst>
+              <a:ext uri="{FF2B5EF4-FFF2-40B4-BE49-F238E27FC236}">
+                <a16:creationId xmlns:a16="http://schemas.microsoft.com/office/drawing/2014/main" id="{C89644AF-733D-4154-842F-8F49313B56C6}"/>
+              </a:ext>
+            </a:extLst>
+          </p:cNvPr>
+          <p:cNvSpPr>
+            <a:spLocks noGrp="1"/>
+          </p:cNvSpPr>
+          <p:nvPr>
+            <p:ph type="sldNum" sz="quarter" idx="12"/>
+          </p:nvPr>
+        </p:nvSpPr>
+        <p:spPr/>
+        <p:txBody>
+          <a:bodyPr/>
+          <a:lstStyle/>
+          <a:p>
+            <a:fld id="{40FC477F-3197-4E88-B387-83A53B82C48D}" type="slidenum">
+              <a:rPr lang="en-US" smtClean="0"/>
+              <a:t>23</a:t>
+            </a:fld>
+            <a:endParaRPr lang="en-US"/>
+          </a:p>
+        </p:txBody>
+      </p:sp>
       <p:pic>
         <p:nvPicPr>
-          <p:cNvPr id="4" name="Picture 3" descr="A screenshot of a cell phone&#10;&#10;Description automatically generated">
+          <p:cNvPr id="7" name="Picture 6">
             <a:extLst>
               <a:ext uri="{FF2B5EF4-FFF2-40B4-BE49-F238E27FC236}">
-                <a16:creationId xmlns:a16="http://schemas.microsoft.com/office/drawing/2014/main" id="{4F52FE55-2235-477E-9FB7-037540EE21D6}"/>
+                <a16:creationId xmlns:a16="http://schemas.microsoft.com/office/drawing/2014/main" id="{E378C4B0-3B1D-4E65-92BC-183968E71FB1}"/>
               </a:ext>
             </a:extLst>
           </p:cNvPr>
@@ -12745,71 +12796,14 @@
         </p:blipFill>
         <p:spPr>
           <a:xfrm>
-            <a:off x="1795806" y="1211587"/>
-            <a:ext cx="9090065" cy="5646413"/>
+            <a:off x="3421086" y="813159"/>
+            <a:ext cx="8156667" cy="4983483"/>
           </a:xfrm>
           <a:prstGeom prst="rect">
             <a:avLst/>
           </a:prstGeom>
         </p:spPr>
       </p:pic>
-      <p:sp>
-        <p:nvSpPr>
-          <p:cNvPr id="3" name="Footer Placeholder 2">
-            <a:extLst>
-              <a:ext uri="{FF2B5EF4-FFF2-40B4-BE49-F238E27FC236}">
-                <a16:creationId xmlns:a16="http://schemas.microsoft.com/office/drawing/2014/main" id="{87B50719-C0C2-4DCB-B6D3-48BD38959E84}"/>
-              </a:ext>
-            </a:extLst>
-          </p:cNvPr>
-          <p:cNvSpPr>
-            <a:spLocks noGrp="1"/>
-          </p:cNvSpPr>
-          <p:nvPr>
-            <p:ph type="ftr" sz="quarter" idx="11"/>
-          </p:nvPr>
-        </p:nvSpPr>
-        <p:spPr/>
-        <p:txBody>
-          <a:bodyPr/>
-          <a:lstStyle/>
-          <a:p>
-            <a:r>
-              <a:rPr lang="en-US"/>
-              <a:t>Mark Fuller, Kevin Kulda, Connor Woodahl --- https://github.com/markfuller/BNU</a:t>
-            </a:r>
-          </a:p>
-        </p:txBody>
-      </p:sp>
-      <p:sp>
-        <p:nvSpPr>
-          <p:cNvPr id="5" name="Slide Number Placeholder 4">
-            <a:extLst>
-              <a:ext uri="{FF2B5EF4-FFF2-40B4-BE49-F238E27FC236}">
-                <a16:creationId xmlns:a16="http://schemas.microsoft.com/office/drawing/2014/main" id="{C89644AF-733D-4154-842F-8F49313B56C6}"/>
-              </a:ext>
-            </a:extLst>
-          </p:cNvPr>
-          <p:cNvSpPr>
-            <a:spLocks noGrp="1"/>
-          </p:cNvSpPr>
-          <p:nvPr>
-            <p:ph type="sldNum" sz="quarter" idx="12"/>
-          </p:nvPr>
-        </p:nvSpPr>
-        <p:spPr/>
-        <p:txBody>
-          <a:bodyPr/>
-          <a:lstStyle/>
-          <a:p>
-            <a:fld id="{40FC477F-3197-4E88-B387-83A53B82C48D}" type="slidenum">
-              <a:rPr lang="en-US" smtClean="0"/>
-              <a:t>23</a:t>
-            </a:fld>
-            <a:endParaRPr lang="en-US"/>
-          </a:p>
-        </p:txBody>
-      </p:sp>
     </p:spTree>
     <p:extLst>
       <p:ext uri="{BB962C8B-B14F-4D97-AF65-F5344CB8AC3E}">
@@ -12868,12 +12862,69 @@
           </a:p>
         </p:txBody>
       </p:sp>
+      <p:sp>
+        <p:nvSpPr>
+          <p:cNvPr id="3" name="Footer Placeholder 2">
+            <a:extLst>
+              <a:ext uri="{FF2B5EF4-FFF2-40B4-BE49-F238E27FC236}">
+                <a16:creationId xmlns:a16="http://schemas.microsoft.com/office/drawing/2014/main" id="{542DFA85-9DCA-4B46-93FC-567F438CB3C9}"/>
+              </a:ext>
+            </a:extLst>
+          </p:cNvPr>
+          <p:cNvSpPr>
+            <a:spLocks noGrp="1"/>
+          </p:cNvSpPr>
+          <p:nvPr>
+            <p:ph type="ftr" sz="quarter" idx="11"/>
+          </p:nvPr>
+        </p:nvSpPr>
+        <p:spPr/>
+        <p:txBody>
+          <a:bodyPr/>
+          <a:lstStyle/>
+          <a:p>
+            <a:r>
+              <a:rPr lang="en-US"/>
+              <a:t>Mark Fuller, Kevin Kulda, Connor Woodahl --- https://github.com/markfuller/BNU</a:t>
+            </a:r>
+          </a:p>
+        </p:txBody>
+      </p:sp>
+      <p:sp>
+        <p:nvSpPr>
+          <p:cNvPr id="5" name="Slide Number Placeholder 4">
+            <a:extLst>
+              <a:ext uri="{FF2B5EF4-FFF2-40B4-BE49-F238E27FC236}">
+                <a16:creationId xmlns:a16="http://schemas.microsoft.com/office/drawing/2014/main" id="{74E2685D-041F-439C-B13B-0F446AFF5C3B}"/>
+              </a:ext>
+            </a:extLst>
+          </p:cNvPr>
+          <p:cNvSpPr>
+            <a:spLocks noGrp="1"/>
+          </p:cNvSpPr>
+          <p:nvPr>
+            <p:ph type="sldNum" sz="quarter" idx="12"/>
+          </p:nvPr>
+        </p:nvSpPr>
+        <p:spPr/>
+        <p:txBody>
+          <a:bodyPr/>
+          <a:lstStyle/>
+          <a:p>
+            <a:fld id="{40FC477F-3197-4E88-B387-83A53B82C48D}" type="slidenum">
+              <a:rPr lang="en-US" smtClean="0"/>
+              <a:t>24</a:t>
+            </a:fld>
+            <a:endParaRPr lang="en-US"/>
+          </a:p>
+        </p:txBody>
+      </p:sp>
       <p:pic>
         <p:nvPicPr>
-          <p:cNvPr id="4" name="Picture 3" descr="A picture containing screenshot&#10;&#10;Description automatically generated">
+          <p:cNvPr id="9" name="Picture 8">
             <a:extLst>
               <a:ext uri="{FF2B5EF4-FFF2-40B4-BE49-F238E27FC236}">
-                <a16:creationId xmlns:a16="http://schemas.microsoft.com/office/drawing/2014/main" id="{97922C24-C477-44E0-8811-1F9A57CFF8CD}"/>
+                <a16:creationId xmlns:a16="http://schemas.microsoft.com/office/drawing/2014/main" id="{1BB88E77-CDB4-46BB-804D-E289AE584A1E}"/>
               </a:ext>
             </a:extLst>
           </p:cNvPr>
@@ -12896,71 +12947,14 @@
         </p:blipFill>
         <p:spPr>
           <a:xfrm>
-            <a:off x="1251678" y="1312869"/>
-            <a:ext cx="10178322" cy="5162746"/>
+            <a:off x="3820081" y="587829"/>
+            <a:ext cx="7599033" cy="5208814"/>
           </a:xfrm>
           <a:prstGeom prst="rect">
             <a:avLst/>
           </a:prstGeom>
         </p:spPr>
       </p:pic>
-      <p:sp>
-        <p:nvSpPr>
-          <p:cNvPr id="3" name="Footer Placeholder 2">
-            <a:extLst>
-              <a:ext uri="{FF2B5EF4-FFF2-40B4-BE49-F238E27FC236}">
-                <a16:creationId xmlns:a16="http://schemas.microsoft.com/office/drawing/2014/main" id="{542DFA85-9DCA-4B46-93FC-567F438CB3C9}"/>
-              </a:ext>
-            </a:extLst>
-          </p:cNvPr>
-          <p:cNvSpPr>
-            <a:spLocks noGrp="1"/>
-          </p:cNvSpPr>
-          <p:nvPr>
-            <p:ph type="ftr" sz="quarter" idx="11"/>
-          </p:nvPr>
-        </p:nvSpPr>
-        <p:spPr/>
-        <p:txBody>
-          <a:bodyPr/>
-          <a:lstStyle/>
-          <a:p>
-            <a:r>
-              <a:rPr lang="en-US"/>
-              <a:t>Mark Fuller, Kevin Kulda, Connor Woodahl --- https://github.com/markfuller/BNU</a:t>
-            </a:r>
-          </a:p>
-        </p:txBody>
-      </p:sp>
-      <p:sp>
-        <p:nvSpPr>
-          <p:cNvPr id="5" name="Slide Number Placeholder 4">
-            <a:extLst>
-              <a:ext uri="{FF2B5EF4-FFF2-40B4-BE49-F238E27FC236}">
-                <a16:creationId xmlns:a16="http://schemas.microsoft.com/office/drawing/2014/main" id="{74E2685D-041F-439C-B13B-0F446AFF5C3B}"/>
-              </a:ext>
-            </a:extLst>
-          </p:cNvPr>
-          <p:cNvSpPr>
-            <a:spLocks noGrp="1"/>
-          </p:cNvSpPr>
-          <p:nvPr>
-            <p:ph type="sldNum" sz="quarter" idx="12"/>
-          </p:nvPr>
-        </p:nvSpPr>
-        <p:spPr/>
-        <p:txBody>
-          <a:bodyPr/>
-          <a:lstStyle/>
-          <a:p>
-            <a:fld id="{40FC477F-3197-4E88-B387-83A53B82C48D}" type="slidenum">
-              <a:rPr lang="en-US" smtClean="0"/>
-              <a:t>24</a:t>
-            </a:fld>
-            <a:endParaRPr lang="en-US"/>
-          </a:p>
-        </p:txBody>
-      </p:sp>
     </p:spTree>
     <p:extLst>
       <p:ext uri="{BB962C8B-B14F-4D97-AF65-F5344CB8AC3E}">
@@ -13019,12 +13013,69 @@
           </a:p>
         </p:txBody>
       </p:sp>
+      <p:sp>
+        <p:nvSpPr>
+          <p:cNvPr id="3" name="Footer Placeholder 2">
+            <a:extLst>
+              <a:ext uri="{FF2B5EF4-FFF2-40B4-BE49-F238E27FC236}">
+                <a16:creationId xmlns:a16="http://schemas.microsoft.com/office/drawing/2014/main" id="{88F908A1-4D87-42D7-8338-9B85D2357CAC}"/>
+              </a:ext>
+            </a:extLst>
+          </p:cNvPr>
+          <p:cNvSpPr>
+            <a:spLocks noGrp="1"/>
+          </p:cNvSpPr>
+          <p:nvPr>
+            <p:ph type="ftr" sz="quarter" idx="11"/>
+          </p:nvPr>
+        </p:nvSpPr>
+        <p:spPr/>
+        <p:txBody>
+          <a:bodyPr/>
+          <a:lstStyle/>
+          <a:p>
+            <a:r>
+              <a:rPr lang="en-US"/>
+              <a:t>Mark Fuller, Kevin Kulda, Connor Woodahl --- https://github.com/markfuller/BNU</a:t>
+            </a:r>
+          </a:p>
+        </p:txBody>
+      </p:sp>
+      <p:sp>
+        <p:nvSpPr>
+          <p:cNvPr id="5" name="Slide Number Placeholder 4">
+            <a:extLst>
+              <a:ext uri="{FF2B5EF4-FFF2-40B4-BE49-F238E27FC236}">
+                <a16:creationId xmlns:a16="http://schemas.microsoft.com/office/drawing/2014/main" id="{6BA8E356-CC55-4694-B188-659C0FE5EA04}"/>
+              </a:ext>
+            </a:extLst>
+          </p:cNvPr>
+          <p:cNvSpPr>
+            <a:spLocks noGrp="1"/>
+          </p:cNvSpPr>
+          <p:nvPr>
+            <p:ph type="sldNum" sz="quarter" idx="12"/>
+          </p:nvPr>
+        </p:nvSpPr>
+        <p:spPr/>
+        <p:txBody>
+          <a:bodyPr/>
+          <a:lstStyle/>
+          <a:p>
+            <a:fld id="{40FC477F-3197-4E88-B387-83A53B82C48D}" type="slidenum">
+              <a:rPr lang="en-US" smtClean="0"/>
+              <a:t>25</a:t>
+            </a:fld>
+            <a:endParaRPr lang="en-US"/>
+          </a:p>
+        </p:txBody>
+      </p:sp>
       <p:pic>
         <p:nvPicPr>
-          <p:cNvPr id="4" name="Picture 3" descr="A screenshot of a cell phone&#10;&#10;Description automatically generated">
+          <p:cNvPr id="7" name="Picture 6">
             <a:extLst>
               <a:ext uri="{FF2B5EF4-FFF2-40B4-BE49-F238E27FC236}">
-                <a16:creationId xmlns:a16="http://schemas.microsoft.com/office/drawing/2014/main" id="{7532A1B9-88CC-4354-97EA-9916F822447E}"/>
+                <a16:creationId xmlns:a16="http://schemas.microsoft.com/office/drawing/2014/main" id="{56C6B2F4-48EE-469D-BC6B-75D7E9098D4F}"/>
               </a:ext>
             </a:extLst>
           </p:cNvPr>
@@ -13047,71 +13098,14 @@
         </p:blipFill>
         <p:spPr>
           <a:xfrm>
-            <a:off x="1964846" y="1194539"/>
-            <a:ext cx="8262308" cy="5663461"/>
+            <a:off x="2394532" y="1270360"/>
+            <a:ext cx="9160653" cy="4646554"/>
           </a:xfrm>
           <a:prstGeom prst="rect">
             <a:avLst/>
           </a:prstGeom>
         </p:spPr>
       </p:pic>
-      <p:sp>
-        <p:nvSpPr>
-          <p:cNvPr id="3" name="Footer Placeholder 2">
-            <a:extLst>
-              <a:ext uri="{FF2B5EF4-FFF2-40B4-BE49-F238E27FC236}">
-                <a16:creationId xmlns:a16="http://schemas.microsoft.com/office/drawing/2014/main" id="{88F908A1-4D87-42D7-8338-9B85D2357CAC}"/>
-              </a:ext>
-            </a:extLst>
-          </p:cNvPr>
-          <p:cNvSpPr>
-            <a:spLocks noGrp="1"/>
-          </p:cNvSpPr>
-          <p:nvPr>
-            <p:ph type="ftr" sz="quarter" idx="11"/>
-          </p:nvPr>
-        </p:nvSpPr>
-        <p:spPr/>
-        <p:txBody>
-          <a:bodyPr/>
-          <a:lstStyle/>
-          <a:p>
-            <a:r>
-              <a:rPr lang="en-US"/>
-              <a:t>Mark Fuller, Kevin Kulda, Connor Woodahl --- https://github.com/markfuller/BNU</a:t>
-            </a:r>
-          </a:p>
-        </p:txBody>
-      </p:sp>
-      <p:sp>
-        <p:nvSpPr>
-          <p:cNvPr id="5" name="Slide Number Placeholder 4">
-            <a:extLst>
-              <a:ext uri="{FF2B5EF4-FFF2-40B4-BE49-F238E27FC236}">
-                <a16:creationId xmlns:a16="http://schemas.microsoft.com/office/drawing/2014/main" id="{6BA8E356-CC55-4694-B188-659C0FE5EA04}"/>
-              </a:ext>
-            </a:extLst>
-          </p:cNvPr>
-          <p:cNvSpPr>
-            <a:spLocks noGrp="1"/>
-          </p:cNvSpPr>
-          <p:nvPr>
-            <p:ph type="sldNum" sz="quarter" idx="12"/>
-          </p:nvPr>
-        </p:nvSpPr>
-        <p:spPr/>
-        <p:txBody>
-          <a:bodyPr/>
-          <a:lstStyle/>
-          <a:p>
-            <a:fld id="{40FC477F-3197-4E88-B387-83A53B82C48D}" type="slidenum">
-              <a:rPr lang="en-US" smtClean="0"/>
-              <a:t>25</a:t>
-            </a:fld>
-            <a:endParaRPr lang="en-US"/>
-          </a:p>
-        </p:txBody>
-      </p:sp>
     </p:spTree>
     <p:extLst>
       <p:ext uri="{BB962C8B-B14F-4D97-AF65-F5344CB8AC3E}">
@@ -13170,12 +13164,69 @@
           </a:p>
         </p:txBody>
       </p:sp>
+      <p:sp>
+        <p:nvSpPr>
+          <p:cNvPr id="3" name="Footer Placeholder 2">
+            <a:extLst>
+              <a:ext uri="{FF2B5EF4-FFF2-40B4-BE49-F238E27FC236}">
+                <a16:creationId xmlns:a16="http://schemas.microsoft.com/office/drawing/2014/main" id="{7AD5FBAA-DD4C-4885-AA5A-B5D63140019D}"/>
+              </a:ext>
+            </a:extLst>
+          </p:cNvPr>
+          <p:cNvSpPr>
+            <a:spLocks noGrp="1"/>
+          </p:cNvSpPr>
+          <p:nvPr>
+            <p:ph type="ftr" sz="quarter" idx="11"/>
+          </p:nvPr>
+        </p:nvSpPr>
+        <p:spPr/>
+        <p:txBody>
+          <a:bodyPr/>
+          <a:lstStyle/>
+          <a:p>
+            <a:r>
+              <a:rPr lang="en-US"/>
+              <a:t>Mark Fuller, Kevin Kulda, Connor Woodahl --- https://github.com/markfuller/BNU</a:t>
+            </a:r>
+          </a:p>
+        </p:txBody>
+      </p:sp>
+      <p:sp>
+        <p:nvSpPr>
+          <p:cNvPr id="5" name="Slide Number Placeholder 4">
+            <a:extLst>
+              <a:ext uri="{FF2B5EF4-FFF2-40B4-BE49-F238E27FC236}">
+                <a16:creationId xmlns:a16="http://schemas.microsoft.com/office/drawing/2014/main" id="{47E81946-DAC3-44A2-9DEE-845FA40CEE0C}"/>
+              </a:ext>
+            </a:extLst>
+          </p:cNvPr>
+          <p:cNvSpPr>
+            <a:spLocks noGrp="1"/>
+          </p:cNvSpPr>
+          <p:nvPr>
+            <p:ph type="sldNum" sz="quarter" idx="12"/>
+          </p:nvPr>
+        </p:nvSpPr>
+        <p:spPr/>
+        <p:txBody>
+          <a:bodyPr/>
+          <a:lstStyle/>
+          <a:p>
+            <a:fld id="{40FC477F-3197-4E88-B387-83A53B82C48D}" type="slidenum">
+              <a:rPr lang="en-US" smtClean="0"/>
+              <a:t>26</a:t>
+            </a:fld>
+            <a:endParaRPr lang="en-US"/>
+          </a:p>
+        </p:txBody>
+      </p:sp>
       <p:pic>
         <p:nvPicPr>
-          <p:cNvPr id="4" name="Picture 3" descr="A screenshot of a social media post&#10;&#10;Description automatically generated">
+          <p:cNvPr id="7" name="Picture 6">
             <a:extLst>
               <a:ext uri="{FF2B5EF4-FFF2-40B4-BE49-F238E27FC236}">
-                <a16:creationId xmlns:a16="http://schemas.microsoft.com/office/drawing/2014/main" id="{22E50683-8D20-4A8F-B8C0-A3A38E2F59D7}"/>
+                <a16:creationId xmlns:a16="http://schemas.microsoft.com/office/drawing/2014/main" id="{B26E334D-DD4A-4374-96FF-B6100A78D554}"/>
               </a:ext>
             </a:extLst>
           </p:cNvPr>
@@ -13198,71 +13249,14 @@
         </p:blipFill>
         <p:spPr>
           <a:xfrm>
-            <a:off x="1938775" y="1317835"/>
-            <a:ext cx="8314449" cy="5364411"/>
+            <a:off x="3605130" y="816428"/>
+            <a:ext cx="7658120" cy="4751614"/>
           </a:xfrm>
           <a:prstGeom prst="rect">
             <a:avLst/>
           </a:prstGeom>
         </p:spPr>
       </p:pic>
-      <p:sp>
-        <p:nvSpPr>
-          <p:cNvPr id="3" name="Footer Placeholder 2">
-            <a:extLst>
-              <a:ext uri="{FF2B5EF4-FFF2-40B4-BE49-F238E27FC236}">
-                <a16:creationId xmlns:a16="http://schemas.microsoft.com/office/drawing/2014/main" id="{7AD5FBAA-DD4C-4885-AA5A-B5D63140019D}"/>
-              </a:ext>
-            </a:extLst>
-          </p:cNvPr>
-          <p:cNvSpPr>
-            <a:spLocks noGrp="1"/>
-          </p:cNvSpPr>
-          <p:nvPr>
-            <p:ph type="ftr" sz="quarter" idx="11"/>
-          </p:nvPr>
-        </p:nvSpPr>
-        <p:spPr/>
-        <p:txBody>
-          <a:bodyPr/>
-          <a:lstStyle/>
-          <a:p>
-            <a:r>
-              <a:rPr lang="en-US"/>
-              <a:t>Mark Fuller, Kevin Kulda, Connor Woodahl --- https://github.com/markfuller/BNU</a:t>
-            </a:r>
-          </a:p>
-        </p:txBody>
-      </p:sp>
-      <p:sp>
-        <p:nvSpPr>
-          <p:cNvPr id="5" name="Slide Number Placeholder 4">
-            <a:extLst>
-              <a:ext uri="{FF2B5EF4-FFF2-40B4-BE49-F238E27FC236}">
-                <a16:creationId xmlns:a16="http://schemas.microsoft.com/office/drawing/2014/main" id="{47E81946-DAC3-44A2-9DEE-845FA40CEE0C}"/>
-              </a:ext>
-            </a:extLst>
-          </p:cNvPr>
-          <p:cNvSpPr>
-            <a:spLocks noGrp="1"/>
-          </p:cNvSpPr>
-          <p:nvPr>
-            <p:ph type="sldNum" sz="quarter" idx="12"/>
-          </p:nvPr>
-        </p:nvSpPr>
-        <p:spPr/>
-        <p:txBody>
-          <a:bodyPr/>
-          <a:lstStyle/>
-          <a:p>
-            <a:fld id="{40FC477F-3197-4E88-B387-83A53B82C48D}" type="slidenum">
-              <a:rPr lang="en-US" smtClean="0"/>
-              <a:t>26</a:t>
-            </a:fld>
-            <a:endParaRPr lang="en-US"/>
-          </a:p>
-        </p:txBody>
-      </p:sp>
     </p:spTree>
     <p:extLst>
       <p:ext uri="{BB962C8B-B14F-4D97-AF65-F5344CB8AC3E}">
@@ -13321,12 +13315,69 @@
           </a:p>
         </p:txBody>
       </p:sp>
+      <p:sp>
+        <p:nvSpPr>
+          <p:cNvPr id="3" name="Footer Placeholder 2">
+            <a:extLst>
+              <a:ext uri="{FF2B5EF4-FFF2-40B4-BE49-F238E27FC236}">
+                <a16:creationId xmlns:a16="http://schemas.microsoft.com/office/drawing/2014/main" id="{94CBA223-CE58-47DD-A01A-EDF53243AC40}"/>
+              </a:ext>
+            </a:extLst>
+          </p:cNvPr>
+          <p:cNvSpPr>
+            <a:spLocks noGrp="1"/>
+          </p:cNvSpPr>
+          <p:nvPr>
+            <p:ph type="ftr" sz="quarter" idx="11"/>
+          </p:nvPr>
+        </p:nvSpPr>
+        <p:spPr/>
+        <p:txBody>
+          <a:bodyPr/>
+          <a:lstStyle/>
+          <a:p>
+            <a:r>
+              <a:rPr lang="en-US"/>
+              <a:t>Mark Fuller, Kevin Kulda, Connor Woodahl --- https://github.com/markfuller/BNU</a:t>
+            </a:r>
+          </a:p>
+        </p:txBody>
+      </p:sp>
+      <p:sp>
+        <p:nvSpPr>
+          <p:cNvPr id="5" name="Slide Number Placeholder 4">
+            <a:extLst>
+              <a:ext uri="{FF2B5EF4-FFF2-40B4-BE49-F238E27FC236}">
+                <a16:creationId xmlns:a16="http://schemas.microsoft.com/office/drawing/2014/main" id="{8A3547E5-34EB-4D54-BF66-A29EC953B962}"/>
+              </a:ext>
+            </a:extLst>
+          </p:cNvPr>
+          <p:cNvSpPr>
+            <a:spLocks noGrp="1"/>
+          </p:cNvSpPr>
+          <p:nvPr>
+            <p:ph type="sldNum" sz="quarter" idx="12"/>
+          </p:nvPr>
+        </p:nvSpPr>
+        <p:spPr/>
+        <p:txBody>
+          <a:bodyPr/>
+          <a:lstStyle/>
+          <a:p>
+            <a:fld id="{40FC477F-3197-4E88-B387-83A53B82C48D}" type="slidenum">
+              <a:rPr lang="en-US" smtClean="0"/>
+              <a:t>27</a:t>
+            </a:fld>
+            <a:endParaRPr lang="en-US"/>
+          </a:p>
+        </p:txBody>
+      </p:sp>
       <p:pic>
         <p:nvPicPr>
-          <p:cNvPr id="4" name="Picture 3" descr="A screenshot of a social media post&#10;&#10;Description automatically generated">
+          <p:cNvPr id="7" name="Picture 6">
             <a:extLst>
               <a:ext uri="{FF2B5EF4-FFF2-40B4-BE49-F238E27FC236}">
-                <a16:creationId xmlns:a16="http://schemas.microsoft.com/office/drawing/2014/main" id="{A20B7A15-FD22-43F9-B73C-2179118154BD}"/>
+                <a16:creationId xmlns:a16="http://schemas.microsoft.com/office/drawing/2014/main" id="{3690A1E6-23D6-4257-BDED-BEAED5345A3D}"/>
               </a:ext>
             </a:extLst>
           </p:cNvPr>
@@ -13349,71 +13400,14 @@
         </p:blipFill>
         <p:spPr>
           <a:xfrm>
-            <a:off x="1807745" y="1159191"/>
-            <a:ext cx="9788967" cy="5698809"/>
+            <a:off x="3389198" y="382385"/>
+            <a:ext cx="8113641" cy="5437414"/>
           </a:xfrm>
           <a:prstGeom prst="rect">
             <a:avLst/>
           </a:prstGeom>
         </p:spPr>
       </p:pic>
-      <p:sp>
-        <p:nvSpPr>
-          <p:cNvPr id="3" name="Footer Placeholder 2">
-            <a:extLst>
-              <a:ext uri="{FF2B5EF4-FFF2-40B4-BE49-F238E27FC236}">
-                <a16:creationId xmlns:a16="http://schemas.microsoft.com/office/drawing/2014/main" id="{94CBA223-CE58-47DD-A01A-EDF53243AC40}"/>
-              </a:ext>
-            </a:extLst>
-          </p:cNvPr>
-          <p:cNvSpPr>
-            <a:spLocks noGrp="1"/>
-          </p:cNvSpPr>
-          <p:nvPr>
-            <p:ph type="ftr" sz="quarter" idx="11"/>
-          </p:nvPr>
-        </p:nvSpPr>
-        <p:spPr/>
-        <p:txBody>
-          <a:bodyPr/>
-          <a:lstStyle/>
-          <a:p>
-            <a:r>
-              <a:rPr lang="en-US"/>
-              <a:t>Mark Fuller, Kevin Kulda, Connor Woodahl --- https://github.com/markfuller/BNU</a:t>
-            </a:r>
-          </a:p>
-        </p:txBody>
-      </p:sp>
-      <p:sp>
-        <p:nvSpPr>
-          <p:cNvPr id="5" name="Slide Number Placeholder 4">
-            <a:extLst>
-              <a:ext uri="{FF2B5EF4-FFF2-40B4-BE49-F238E27FC236}">
-                <a16:creationId xmlns:a16="http://schemas.microsoft.com/office/drawing/2014/main" id="{8A3547E5-34EB-4D54-BF66-A29EC953B962}"/>
-              </a:ext>
-            </a:extLst>
-          </p:cNvPr>
-          <p:cNvSpPr>
-            <a:spLocks noGrp="1"/>
-          </p:cNvSpPr>
-          <p:nvPr>
-            <p:ph type="sldNum" sz="quarter" idx="12"/>
-          </p:nvPr>
-        </p:nvSpPr>
-        <p:spPr/>
-        <p:txBody>
-          <a:bodyPr/>
-          <a:lstStyle/>
-          <a:p>
-            <a:fld id="{40FC477F-3197-4E88-B387-83A53B82C48D}" type="slidenum">
-              <a:rPr lang="en-US" smtClean="0"/>
-              <a:t>27</a:t>
-            </a:fld>
-            <a:endParaRPr lang="en-US"/>
-          </a:p>
-        </p:txBody>
-      </p:sp>
     </p:spTree>
     <p:extLst>
       <p:ext uri="{BB962C8B-B14F-4D97-AF65-F5344CB8AC3E}">
@@ -13472,12 +13466,69 @@
           </a:p>
         </p:txBody>
       </p:sp>
+      <p:sp>
+        <p:nvSpPr>
+          <p:cNvPr id="3" name="Footer Placeholder 2">
+            <a:extLst>
+              <a:ext uri="{FF2B5EF4-FFF2-40B4-BE49-F238E27FC236}">
+                <a16:creationId xmlns:a16="http://schemas.microsoft.com/office/drawing/2014/main" id="{467C1316-BE3D-4C2B-835A-37970B12CABB}"/>
+              </a:ext>
+            </a:extLst>
+          </p:cNvPr>
+          <p:cNvSpPr>
+            <a:spLocks noGrp="1"/>
+          </p:cNvSpPr>
+          <p:nvPr>
+            <p:ph type="ftr" sz="quarter" idx="11"/>
+          </p:nvPr>
+        </p:nvSpPr>
+        <p:spPr/>
+        <p:txBody>
+          <a:bodyPr/>
+          <a:lstStyle/>
+          <a:p>
+            <a:r>
+              <a:rPr lang="en-US"/>
+              <a:t>Mark Fuller, Kevin Kulda, Connor Woodahl --- https://github.com/markfuller/BNU</a:t>
+            </a:r>
+          </a:p>
+        </p:txBody>
+      </p:sp>
+      <p:sp>
+        <p:nvSpPr>
+          <p:cNvPr id="5" name="Slide Number Placeholder 4">
+            <a:extLst>
+              <a:ext uri="{FF2B5EF4-FFF2-40B4-BE49-F238E27FC236}">
+                <a16:creationId xmlns:a16="http://schemas.microsoft.com/office/drawing/2014/main" id="{8954D159-07BB-47C3-9904-E118211FA336}"/>
+              </a:ext>
+            </a:extLst>
+          </p:cNvPr>
+          <p:cNvSpPr>
+            <a:spLocks noGrp="1"/>
+          </p:cNvSpPr>
+          <p:nvPr>
+            <p:ph type="sldNum" sz="quarter" idx="12"/>
+          </p:nvPr>
+        </p:nvSpPr>
+        <p:spPr/>
+        <p:txBody>
+          <a:bodyPr/>
+          <a:lstStyle/>
+          <a:p>
+            <a:fld id="{40FC477F-3197-4E88-B387-83A53B82C48D}" type="slidenum">
+              <a:rPr lang="en-US" smtClean="0"/>
+              <a:t>28</a:t>
+            </a:fld>
+            <a:endParaRPr lang="en-US"/>
+          </a:p>
+        </p:txBody>
+      </p:sp>
       <p:pic>
         <p:nvPicPr>
-          <p:cNvPr id="4" name="Picture 3" descr="A screenshot of a social media post&#10;&#10;Description automatically generated">
+          <p:cNvPr id="7" name="Picture 6">
             <a:extLst>
               <a:ext uri="{FF2B5EF4-FFF2-40B4-BE49-F238E27FC236}">
-                <a16:creationId xmlns:a16="http://schemas.microsoft.com/office/drawing/2014/main" id="{C6F11686-7686-425D-B82B-2E928B9EB4E3}"/>
+                <a16:creationId xmlns:a16="http://schemas.microsoft.com/office/drawing/2014/main" id="{CF7D9FE3-EBBC-4745-8FA7-3588D494DF65}"/>
               </a:ext>
             </a:extLst>
           </p:cNvPr>
@@ -13500,71 +13551,14 @@
         </p:blipFill>
         <p:spPr>
           <a:xfrm>
-            <a:off x="1699498" y="1186555"/>
-            <a:ext cx="9282682" cy="5671445"/>
+            <a:off x="3526972" y="459436"/>
+            <a:ext cx="7435358" cy="5239235"/>
           </a:xfrm>
           <a:prstGeom prst="rect">
             <a:avLst/>
           </a:prstGeom>
         </p:spPr>
       </p:pic>
-      <p:sp>
-        <p:nvSpPr>
-          <p:cNvPr id="3" name="Footer Placeholder 2">
-            <a:extLst>
-              <a:ext uri="{FF2B5EF4-FFF2-40B4-BE49-F238E27FC236}">
-                <a16:creationId xmlns:a16="http://schemas.microsoft.com/office/drawing/2014/main" id="{467C1316-BE3D-4C2B-835A-37970B12CABB}"/>
-              </a:ext>
-            </a:extLst>
-          </p:cNvPr>
-          <p:cNvSpPr>
-            <a:spLocks noGrp="1"/>
-          </p:cNvSpPr>
-          <p:nvPr>
-            <p:ph type="ftr" sz="quarter" idx="11"/>
-          </p:nvPr>
-        </p:nvSpPr>
-        <p:spPr/>
-        <p:txBody>
-          <a:bodyPr/>
-          <a:lstStyle/>
-          <a:p>
-            <a:r>
-              <a:rPr lang="en-US"/>
-              <a:t>Mark Fuller, Kevin Kulda, Connor Woodahl --- https://github.com/markfuller/BNU</a:t>
-            </a:r>
-          </a:p>
-        </p:txBody>
-      </p:sp>
-      <p:sp>
-        <p:nvSpPr>
-          <p:cNvPr id="5" name="Slide Number Placeholder 4">
-            <a:extLst>
-              <a:ext uri="{FF2B5EF4-FFF2-40B4-BE49-F238E27FC236}">
-                <a16:creationId xmlns:a16="http://schemas.microsoft.com/office/drawing/2014/main" id="{8954D159-07BB-47C3-9904-E118211FA336}"/>
-              </a:ext>
-            </a:extLst>
-          </p:cNvPr>
-          <p:cNvSpPr>
-            <a:spLocks noGrp="1"/>
-          </p:cNvSpPr>
-          <p:nvPr>
-            <p:ph type="sldNum" sz="quarter" idx="12"/>
-          </p:nvPr>
-        </p:nvSpPr>
-        <p:spPr/>
-        <p:txBody>
-          <a:bodyPr/>
-          <a:lstStyle/>
-          <a:p>
-            <a:fld id="{40FC477F-3197-4E88-B387-83A53B82C48D}" type="slidenum">
-              <a:rPr lang="en-US" smtClean="0"/>
-              <a:t>28</a:t>
-            </a:fld>
-            <a:endParaRPr lang="en-US"/>
-          </a:p>
-        </p:txBody>
-      </p:sp>
     </p:spTree>
     <p:extLst>
       <p:ext uri="{BB962C8B-B14F-4D97-AF65-F5344CB8AC3E}">
@@ -13623,12 +13617,69 @@
           </a:p>
         </p:txBody>
       </p:sp>
+      <p:sp>
+        <p:nvSpPr>
+          <p:cNvPr id="3" name="Footer Placeholder 2">
+            <a:extLst>
+              <a:ext uri="{FF2B5EF4-FFF2-40B4-BE49-F238E27FC236}">
+                <a16:creationId xmlns:a16="http://schemas.microsoft.com/office/drawing/2014/main" id="{35D3E4E7-F0CD-4C83-8DA7-7FA20A694C10}"/>
+              </a:ext>
+            </a:extLst>
+          </p:cNvPr>
+          <p:cNvSpPr>
+            <a:spLocks noGrp="1"/>
+          </p:cNvSpPr>
+          <p:nvPr>
+            <p:ph type="ftr" sz="quarter" idx="11"/>
+          </p:nvPr>
+        </p:nvSpPr>
+        <p:spPr/>
+        <p:txBody>
+          <a:bodyPr/>
+          <a:lstStyle/>
+          <a:p>
+            <a:r>
+              <a:rPr lang="en-US"/>
+              <a:t>Mark Fuller, Kevin Kulda, Connor Woodahl --- https://github.com/markfuller/BNU</a:t>
+            </a:r>
+          </a:p>
+        </p:txBody>
+      </p:sp>
+      <p:sp>
+        <p:nvSpPr>
+          <p:cNvPr id="5" name="Slide Number Placeholder 4">
+            <a:extLst>
+              <a:ext uri="{FF2B5EF4-FFF2-40B4-BE49-F238E27FC236}">
+                <a16:creationId xmlns:a16="http://schemas.microsoft.com/office/drawing/2014/main" id="{B6011963-8E35-494E-83F3-3C17F931B09D}"/>
+              </a:ext>
+            </a:extLst>
+          </p:cNvPr>
+          <p:cNvSpPr>
+            <a:spLocks noGrp="1"/>
+          </p:cNvSpPr>
+          <p:nvPr>
+            <p:ph type="sldNum" sz="quarter" idx="12"/>
+          </p:nvPr>
+        </p:nvSpPr>
+        <p:spPr/>
+        <p:txBody>
+          <a:bodyPr/>
+          <a:lstStyle/>
+          <a:p>
+            <a:fld id="{40FC477F-3197-4E88-B387-83A53B82C48D}" type="slidenum">
+              <a:rPr lang="en-US" smtClean="0"/>
+              <a:t>29</a:t>
+            </a:fld>
+            <a:endParaRPr lang="en-US"/>
+          </a:p>
+        </p:txBody>
+      </p:sp>
       <p:pic>
         <p:nvPicPr>
-          <p:cNvPr id="4" name="Picture 3" descr="A screenshot of a social media post&#10;&#10;Description automatically generated">
+          <p:cNvPr id="7" name="Picture 6">
             <a:extLst>
               <a:ext uri="{FF2B5EF4-FFF2-40B4-BE49-F238E27FC236}">
-                <a16:creationId xmlns:a16="http://schemas.microsoft.com/office/drawing/2014/main" id="{A187ADA3-C6E3-4E93-A11C-D4C0B5A79FE6}"/>
+                <a16:creationId xmlns:a16="http://schemas.microsoft.com/office/drawing/2014/main" id="{E582BFA6-DEBF-41D6-BB52-CA36D127EFA4}"/>
               </a:ext>
             </a:extLst>
           </p:cNvPr>
@@ -13651,71 +13702,14 @@
         </p:blipFill>
         <p:spPr>
           <a:xfrm>
-            <a:off x="1785044" y="1079965"/>
-            <a:ext cx="8621911" cy="5778035"/>
+            <a:off x="3183105" y="653142"/>
+            <a:ext cx="8419586" cy="5274129"/>
           </a:xfrm>
           <a:prstGeom prst="rect">
             <a:avLst/>
           </a:prstGeom>
         </p:spPr>
       </p:pic>
-      <p:sp>
-        <p:nvSpPr>
-          <p:cNvPr id="3" name="Footer Placeholder 2">
-            <a:extLst>
-              <a:ext uri="{FF2B5EF4-FFF2-40B4-BE49-F238E27FC236}">
-                <a16:creationId xmlns:a16="http://schemas.microsoft.com/office/drawing/2014/main" id="{35D3E4E7-F0CD-4C83-8DA7-7FA20A694C10}"/>
-              </a:ext>
-            </a:extLst>
-          </p:cNvPr>
-          <p:cNvSpPr>
-            <a:spLocks noGrp="1"/>
-          </p:cNvSpPr>
-          <p:nvPr>
-            <p:ph type="ftr" sz="quarter" idx="11"/>
-          </p:nvPr>
-        </p:nvSpPr>
-        <p:spPr/>
-        <p:txBody>
-          <a:bodyPr/>
-          <a:lstStyle/>
-          <a:p>
-            <a:r>
-              <a:rPr lang="en-US"/>
-              <a:t>Mark Fuller, Kevin Kulda, Connor Woodahl --- https://github.com/markfuller/BNU</a:t>
-            </a:r>
-          </a:p>
-        </p:txBody>
-      </p:sp>
-      <p:sp>
-        <p:nvSpPr>
-          <p:cNvPr id="5" name="Slide Number Placeholder 4">
-            <a:extLst>
-              <a:ext uri="{FF2B5EF4-FFF2-40B4-BE49-F238E27FC236}">
-                <a16:creationId xmlns:a16="http://schemas.microsoft.com/office/drawing/2014/main" id="{B6011963-8E35-494E-83F3-3C17F931B09D}"/>
-              </a:ext>
-            </a:extLst>
-          </p:cNvPr>
-          <p:cNvSpPr>
-            <a:spLocks noGrp="1"/>
-          </p:cNvSpPr>
-          <p:nvPr>
-            <p:ph type="sldNum" sz="quarter" idx="12"/>
-          </p:nvPr>
-        </p:nvSpPr>
-        <p:spPr/>
-        <p:txBody>
-          <a:bodyPr/>
-          <a:lstStyle/>
-          <a:p>
-            <a:fld id="{40FC477F-3197-4E88-B387-83A53B82C48D}" type="slidenum">
-              <a:rPr lang="en-US" smtClean="0"/>
-              <a:t>29</a:t>
-            </a:fld>
-            <a:endParaRPr lang="en-US"/>
-          </a:p>
-        </p:txBody>
-      </p:sp>
     </p:spTree>
     <p:extLst>
       <p:ext uri="{BB962C8B-B14F-4D97-AF65-F5344CB8AC3E}">
@@ -13930,12 +13924,69 @@
           </a:p>
         </p:txBody>
       </p:sp>
+      <p:sp>
+        <p:nvSpPr>
+          <p:cNvPr id="3" name="Footer Placeholder 2">
+            <a:extLst>
+              <a:ext uri="{FF2B5EF4-FFF2-40B4-BE49-F238E27FC236}">
+                <a16:creationId xmlns:a16="http://schemas.microsoft.com/office/drawing/2014/main" id="{C5EF1115-F9A8-4089-AA21-3CA267F637FC}"/>
+              </a:ext>
+            </a:extLst>
+          </p:cNvPr>
+          <p:cNvSpPr>
+            <a:spLocks noGrp="1"/>
+          </p:cNvSpPr>
+          <p:nvPr>
+            <p:ph type="ftr" sz="quarter" idx="11"/>
+          </p:nvPr>
+        </p:nvSpPr>
+        <p:spPr/>
+        <p:txBody>
+          <a:bodyPr/>
+          <a:lstStyle/>
+          <a:p>
+            <a:r>
+              <a:rPr lang="en-US"/>
+              <a:t>Mark Fuller, Kevin Kulda, Connor Woodahl --- https://github.com/markfuller/BNU</a:t>
+            </a:r>
+          </a:p>
+        </p:txBody>
+      </p:sp>
+      <p:sp>
+        <p:nvSpPr>
+          <p:cNvPr id="5" name="Slide Number Placeholder 4">
+            <a:extLst>
+              <a:ext uri="{FF2B5EF4-FFF2-40B4-BE49-F238E27FC236}">
+                <a16:creationId xmlns:a16="http://schemas.microsoft.com/office/drawing/2014/main" id="{DA85A689-42D1-4329-8E06-0F62E4319B1E}"/>
+              </a:ext>
+            </a:extLst>
+          </p:cNvPr>
+          <p:cNvSpPr>
+            <a:spLocks noGrp="1"/>
+          </p:cNvSpPr>
+          <p:nvPr>
+            <p:ph type="sldNum" sz="quarter" idx="12"/>
+          </p:nvPr>
+        </p:nvSpPr>
+        <p:spPr/>
+        <p:txBody>
+          <a:bodyPr/>
+          <a:lstStyle/>
+          <a:p>
+            <a:fld id="{40FC477F-3197-4E88-B387-83A53B82C48D}" type="slidenum">
+              <a:rPr lang="en-US" smtClean="0"/>
+              <a:t>30</a:t>
+            </a:fld>
+            <a:endParaRPr lang="en-US"/>
+          </a:p>
+        </p:txBody>
+      </p:sp>
       <p:pic>
         <p:nvPicPr>
-          <p:cNvPr id="4" name="Picture 3" descr="A screenshot of a cell phone&#10;&#10;Description automatically generated">
+          <p:cNvPr id="7" name="Picture 6">
             <a:extLst>
               <a:ext uri="{FF2B5EF4-FFF2-40B4-BE49-F238E27FC236}">
-                <a16:creationId xmlns:a16="http://schemas.microsoft.com/office/drawing/2014/main" id="{F945B299-5188-410F-BAA2-6FE9D9A663A3}"/>
+                <a16:creationId xmlns:a16="http://schemas.microsoft.com/office/drawing/2014/main" id="{89CB695E-513B-4DB7-B790-2C88F6AEF905}"/>
               </a:ext>
             </a:extLst>
           </p:cNvPr>
@@ -13958,71 +14009,14 @@
         </p:blipFill>
         <p:spPr>
           <a:xfrm>
-            <a:off x="2119785" y="1254417"/>
-            <a:ext cx="7952429" cy="5603583"/>
+            <a:off x="2777455" y="522514"/>
+            <a:ext cx="8806175" cy="5470071"/>
           </a:xfrm>
           <a:prstGeom prst="rect">
             <a:avLst/>
           </a:prstGeom>
         </p:spPr>
       </p:pic>
-      <p:sp>
-        <p:nvSpPr>
-          <p:cNvPr id="3" name="Footer Placeholder 2">
-            <a:extLst>
-              <a:ext uri="{FF2B5EF4-FFF2-40B4-BE49-F238E27FC236}">
-                <a16:creationId xmlns:a16="http://schemas.microsoft.com/office/drawing/2014/main" id="{C5EF1115-F9A8-4089-AA21-3CA267F637FC}"/>
-              </a:ext>
-            </a:extLst>
-          </p:cNvPr>
-          <p:cNvSpPr>
-            <a:spLocks noGrp="1"/>
-          </p:cNvSpPr>
-          <p:nvPr>
-            <p:ph type="ftr" sz="quarter" idx="11"/>
-          </p:nvPr>
-        </p:nvSpPr>
-        <p:spPr/>
-        <p:txBody>
-          <a:bodyPr/>
-          <a:lstStyle/>
-          <a:p>
-            <a:r>
-              <a:rPr lang="en-US"/>
-              <a:t>Mark Fuller, Kevin Kulda, Connor Woodahl --- https://github.com/markfuller/BNU</a:t>
-            </a:r>
-          </a:p>
-        </p:txBody>
-      </p:sp>
-      <p:sp>
-        <p:nvSpPr>
-          <p:cNvPr id="5" name="Slide Number Placeholder 4">
-            <a:extLst>
-              <a:ext uri="{FF2B5EF4-FFF2-40B4-BE49-F238E27FC236}">
-                <a16:creationId xmlns:a16="http://schemas.microsoft.com/office/drawing/2014/main" id="{DA85A689-42D1-4329-8E06-0F62E4319B1E}"/>
-              </a:ext>
-            </a:extLst>
-          </p:cNvPr>
-          <p:cNvSpPr>
-            <a:spLocks noGrp="1"/>
-          </p:cNvSpPr>
-          <p:nvPr>
-            <p:ph type="sldNum" sz="quarter" idx="12"/>
-          </p:nvPr>
-        </p:nvSpPr>
-        <p:spPr/>
-        <p:txBody>
-          <a:bodyPr/>
-          <a:lstStyle/>
-          <a:p>
-            <a:fld id="{40FC477F-3197-4E88-B387-83A53B82C48D}" type="slidenum">
-              <a:rPr lang="en-US" smtClean="0"/>
-              <a:t>30</a:t>
-            </a:fld>
-            <a:endParaRPr lang="en-US"/>
-          </a:p>
-        </p:txBody>
-      </p:sp>
     </p:spTree>
     <p:extLst>
       <p:ext uri="{BB962C8B-B14F-4D97-AF65-F5344CB8AC3E}">
@@ -14081,12 +14075,69 @@
           </a:p>
         </p:txBody>
       </p:sp>
+      <p:sp>
+        <p:nvSpPr>
+          <p:cNvPr id="3" name="Footer Placeholder 2">
+            <a:extLst>
+              <a:ext uri="{FF2B5EF4-FFF2-40B4-BE49-F238E27FC236}">
+                <a16:creationId xmlns:a16="http://schemas.microsoft.com/office/drawing/2014/main" id="{C2C1004C-510A-4E0E-8E8C-1F7FE14C4F93}"/>
+              </a:ext>
+            </a:extLst>
+          </p:cNvPr>
+          <p:cNvSpPr>
+            <a:spLocks noGrp="1"/>
+          </p:cNvSpPr>
+          <p:nvPr>
+            <p:ph type="ftr" sz="quarter" idx="11"/>
+          </p:nvPr>
+        </p:nvSpPr>
+        <p:spPr/>
+        <p:txBody>
+          <a:bodyPr/>
+          <a:lstStyle/>
+          <a:p>
+            <a:r>
+              <a:rPr lang="en-US"/>
+              <a:t>Mark Fuller, Kevin Kulda, Connor Woodahl --- https://github.com/markfuller/BNU</a:t>
+            </a:r>
+          </a:p>
+        </p:txBody>
+      </p:sp>
+      <p:sp>
+        <p:nvSpPr>
+          <p:cNvPr id="5" name="Slide Number Placeholder 4">
+            <a:extLst>
+              <a:ext uri="{FF2B5EF4-FFF2-40B4-BE49-F238E27FC236}">
+                <a16:creationId xmlns:a16="http://schemas.microsoft.com/office/drawing/2014/main" id="{A49C2F70-7C58-4F67-BC14-28CB450C01D6}"/>
+              </a:ext>
+            </a:extLst>
+          </p:cNvPr>
+          <p:cNvSpPr>
+            <a:spLocks noGrp="1"/>
+          </p:cNvSpPr>
+          <p:nvPr>
+            <p:ph type="sldNum" sz="quarter" idx="12"/>
+          </p:nvPr>
+        </p:nvSpPr>
+        <p:spPr/>
+        <p:txBody>
+          <a:bodyPr/>
+          <a:lstStyle/>
+          <a:p>
+            <a:fld id="{40FC477F-3197-4E88-B387-83A53B82C48D}" type="slidenum">
+              <a:rPr lang="en-US" smtClean="0"/>
+              <a:t>31</a:t>
+            </a:fld>
+            <a:endParaRPr lang="en-US"/>
+          </a:p>
+        </p:txBody>
+      </p:sp>
       <p:pic>
         <p:nvPicPr>
-          <p:cNvPr id="4" name="Picture 3" descr="A screenshot of a social media post&#10;&#10;Description automatically generated">
+          <p:cNvPr id="9" name="Picture 8">
             <a:extLst>
               <a:ext uri="{FF2B5EF4-FFF2-40B4-BE49-F238E27FC236}">
-                <a16:creationId xmlns:a16="http://schemas.microsoft.com/office/drawing/2014/main" id="{22B907EE-406E-4516-916D-E10F70226481}"/>
+                <a16:creationId xmlns:a16="http://schemas.microsoft.com/office/drawing/2014/main" id="{8C5DDB8E-CB61-4FC7-97E2-DA439A3B0625}"/>
               </a:ext>
             </a:extLst>
           </p:cNvPr>
@@ -14109,71 +14160,14 @@
         </p:blipFill>
         <p:spPr>
           <a:xfrm>
-            <a:off x="1986488" y="1249212"/>
-            <a:ext cx="8953834" cy="5608788"/>
+            <a:off x="2955471" y="382385"/>
+            <a:ext cx="8948953" cy="5209781"/>
           </a:xfrm>
           <a:prstGeom prst="rect">
             <a:avLst/>
           </a:prstGeom>
         </p:spPr>
       </p:pic>
-      <p:sp>
-        <p:nvSpPr>
-          <p:cNvPr id="3" name="Footer Placeholder 2">
-            <a:extLst>
-              <a:ext uri="{FF2B5EF4-FFF2-40B4-BE49-F238E27FC236}">
-                <a16:creationId xmlns:a16="http://schemas.microsoft.com/office/drawing/2014/main" id="{C2C1004C-510A-4E0E-8E8C-1F7FE14C4F93}"/>
-              </a:ext>
-            </a:extLst>
-          </p:cNvPr>
-          <p:cNvSpPr>
-            <a:spLocks noGrp="1"/>
-          </p:cNvSpPr>
-          <p:nvPr>
-            <p:ph type="ftr" sz="quarter" idx="11"/>
-          </p:nvPr>
-        </p:nvSpPr>
-        <p:spPr/>
-        <p:txBody>
-          <a:bodyPr/>
-          <a:lstStyle/>
-          <a:p>
-            <a:r>
-              <a:rPr lang="en-US"/>
-              <a:t>Mark Fuller, Kevin Kulda, Connor Woodahl --- https://github.com/markfuller/BNU</a:t>
-            </a:r>
-          </a:p>
-        </p:txBody>
-      </p:sp>
-      <p:sp>
-        <p:nvSpPr>
-          <p:cNvPr id="5" name="Slide Number Placeholder 4">
-            <a:extLst>
-              <a:ext uri="{FF2B5EF4-FFF2-40B4-BE49-F238E27FC236}">
-                <a16:creationId xmlns:a16="http://schemas.microsoft.com/office/drawing/2014/main" id="{A49C2F70-7C58-4F67-BC14-28CB450C01D6}"/>
-              </a:ext>
-            </a:extLst>
-          </p:cNvPr>
-          <p:cNvSpPr>
-            <a:spLocks noGrp="1"/>
-          </p:cNvSpPr>
-          <p:nvPr>
-            <p:ph type="sldNum" sz="quarter" idx="12"/>
-          </p:nvPr>
-        </p:nvSpPr>
-        <p:spPr/>
-        <p:txBody>
-          <a:bodyPr/>
-          <a:lstStyle/>
-          <a:p>
-            <a:fld id="{40FC477F-3197-4E88-B387-83A53B82C48D}" type="slidenum">
-              <a:rPr lang="en-US" smtClean="0"/>
-              <a:t>31</a:t>
-            </a:fld>
-            <a:endParaRPr lang="en-US"/>
-          </a:p>
-        </p:txBody>
-      </p:sp>
     </p:spTree>
     <p:extLst>
       <p:ext uri="{BB962C8B-B14F-4D97-AF65-F5344CB8AC3E}">

</xml_diff>